<commit_message>
worked on embedding and ml content
</commit_message>
<xml_diff>
--- a/5_seminar/Contents_Part_02/slides/slides_II_1.pptx
+++ b/5_seminar/Contents_Part_02/slides/slides_II_1.pptx
@@ -235,7 +235,7 @@
           <a:p>
             <a:fld id="{7A5B87F2-13FD-4A24-9F19-39B31C60B536}" type="datetimeFigureOut">
               <a:rPr lang="en-US" smtClean="0"/>
-              <a:t>4/27/2021</a:t>
+              <a:t>5/1/2021</a:t>
             </a:fld>
             <a:endParaRPr lang="en-US"/>
           </a:p>
@@ -4255,7 +4255,7 @@
           <a:p>
             <a:fld id="{5A1811BA-6AD9-41A7-B7A2-456C8523519C}" type="datetime1">
               <a:rPr lang="en-US" smtClean="0"/>
-              <a:t>4/27/2021</a:t>
+              <a:t>5/1/2021</a:t>
             </a:fld>
             <a:endParaRPr lang="en-US"/>
           </a:p>
@@ -4425,7 +4425,7 @@
           <a:p>
             <a:fld id="{B0494441-C196-4BB0-93EE-AF22360207AB}" type="datetime1">
               <a:rPr lang="en-US" smtClean="0"/>
-              <a:t>4/27/2021</a:t>
+              <a:t>5/1/2021</a:t>
             </a:fld>
             <a:endParaRPr lang="en-US"/>
           </a:p>
@@ -4605,7 +4605,7 @@
           <a:p>
             <a:fld id="{D7B9282B-C3CE-4F56-8DD1-5349F982F1D2}" type="datetime1">
               <a:rPr lang="en-US" smtClean="0"/>
-              <a:t>4/27/2021</a:t>
+              <a:t>5/1/2021</a:t>
             </a:fld>
             <a:endParaRPr lang="en-US"/>
           </a:p>
@@ -4775,7 +4775,7 @@
           <a:p>
             <a:fld id="{E6E86D6A-786F-4E85-AF3B-385015383ABA}" type="datetime1">
               <a:rPr lang="en-US" smtClean="0"/>
-              <a:t>4/27/2021</a:t>
+              <a:t>5/1/2021</a:t>
             </a:fld>
             <a:endParaRPr lang="en-US"/>
           </a:p>
@@ -5021,7 +5021,7 @@
           <a:p>
             <a:fld id="{051FFEB0-9C80-4A34-A5C7-72D52D52FC7D}" type="datetime1">
               <a:rPr lang="en-US" smtClean="0"/>
-              <a:t>4/27/2021</a:t>
+              <a:t>5/1/2021</a:t>
             </a:fld>
             <a:endParaRPr lang="en-US"/>
           </a:p>
@@ -5253,7 +5253,7 @@
           <a:p>
             <a:fld id="{084267AD-C299-471B-ABA1-D0EA94C7EDCF}" type="datetime1">
               <a:rPr lang="en-US" smtClean="0"/>
-              <a:t>4/27/2021</a:t>
+              <a:t>5/1/2021</a:t>
             </a:fld>
             <a:endParaRPr lang="en-US"/>
           </a:p>
@@ -5620,7 +5620,7 @@
           <a:p>
             <a:fld id="{6468DBC7-10F8-46A1-8CE1-DBB0A6F0EF3E}" type="datetime1">
               <a:rPr lang="en-US" smtClean="0"/>
-              <a:t>4/27/2021</a:t>
+              <a:t>5/1/2021</a:t>
             </a:fld>
             <a:endParaRPr lang="en-US"/>
           </a:p>
@@ -5738,7 +5738,7 @@
           <a:p>
             <a:fld id="{0A97ED80-8DDA-43A7-A78F-B0542D691D0E}" type="datetime1">
               <a:rPr lang="en-US" smtClean="0"/>
-              <a:t>4/27/2021</a:t>
+              <a:t>5/1/2021</a:t>
             </a:fld>
             <a:endParaRPr lang="en-US"/>
           </a:p>
@@ -5833,7 +5833,7 @@
           <a:p>
             <a:fld id="{0AF827E6-45BA-40D2-98F2-BE4FFF095577}" type="datetime1">
               <a:rPr lang="en-US" smtClean="0"/>
-              <a:t>4/27/2021</a:t>
+              <a:t>5/1/2021</a:t>
             </a:fld>
             <a:endParaRPr lang="en-US"/>
           </a:p>
@@ -6110,7 +6110,7 @@
           <a:p>
             <a:fld id="{42BD114C-22EA-4B1A-A45B-ED6465C7BB4E}" type="datetime1">
               <a:rPr lang="en-US" smtClean="0"/>
-              <a:t>4/27/2021</a:t>
+              <a:t>5/1/2021</a:t>
             </a:fld>
             <a:endParaRPr lang="en-US"/>
           </a:p>
@@ -6363,7 +6363,7 @@
           <a:p>
             <a:fld id="{F46F8903-38BE-4FD8-98FC-E4EF771B2D8C}" type="datetime1">
               <a:rPr lang="en-US" smtClean="0"/>
-              <a:t>4/27/2021</a:t>
+              <a:t>5/1/2021</a:t>
             </a:fld>
             <a:endParaRPr lang="en-US"/>
           </a:p>
@@ -6576,7 +6576,7 @@
           <a:p>
             <a:fld id="{A91AC8C7-9CA9-4E83-8CE3-AD3BE4150B39}" type="datetime1">
               <a:rPr lang="en-US" smtClean="0"/>
-              <a:t>4/27/2021</a:t>
+              <a:t>5/1/2021</a:t>
             </a:fld>
             <a:endParaRPr lang="en-US"/>
           </a:p>

</xml_diff>